<commit_message>
added data import slide
</commit_message>
<xml_diff>
--- a/Creating_Resumes_CVs_in_R_Lisa_Cao.pptx
+++ b/Creating_Resumes_CVs_in_R_Lisa_Cao.pptx
@@ -5,7 +5,7 @@
     <p:sldMasterId id="2147483661" r:id="rId1"/>
   </p:sldMasterIdLst>
   <p:notesMasterIdLst>
-    <p:notesMasterId r:id="rId38"/>
+    <p:notesMasterId r:id="rId39"/>
   </p:notesMasterIdLst>
   <p:sldIdLst>
     <p:sldId id="256" r:id="rId2"/>
@@ -35,32 +35,33 @@
     <p:sldId id="291" r:id="rId26"/>
     <p:sldId id="292" r:id="rId27"/>
     <p:sldId id="294" r:id="rId28"/>
-    <p:sldId id="302" r:id="rId29"/>
-    <p:sldId id="303" r:id="rId30"/>
-    <p:sldId id="304" r:id="rId31"/>
-    <p:sldId id="284" r:id="rId32"/>
-    <p:sldId id="306" r:id="rId33"/>
-    <p:sldId id="282" r:id="rId34"/>
-    <p:sldId id="283" r:id="rId35"/>
-    <p:sldId id="313" r:id="rId36"/>
-    <p:sldId id="258" r:id="rId37"/>
+    <p:sldId id="314" r:id="rId29"/>
+    <p:sldId id="302" r:id="rId30"/>
+    <p:sldId id="303" r:id="rId31"/>
+    <p:sldId id="304" r:id="rId32"/>
+    <p:sldId id="284" r:id="rId33"/>
+    <p:sldId id="306" r:id="rId34"/>
+    <p:sldId id="282" r:id="rId35"/>
+    <p:sldId id="283" r:id="rId36"/>
+    <p:sldId id="313" r:id="rId37"/>
+    <p:sldId id="258" r:id="rId38"/>
   </p:sldIdLst>
   <p:sldSz cx="9144000" cy="5143500" type="screen16x9"/>
   <p:notesSz cx="6858000" cy="9144000"/>
   <p:embeddedFontLst>
     <p:embeddedFont>
       <p:font typeface="Helvetica Neue" panose="020B0604020202020204" charset="0"/>
-      <p:regular r:id="rId39"/>
-      <p:bold r:id="rId40"/>
-      <p:italic r:id="rId41"/>
-      <p:boldItalic r:id="rId42"/>
+      <p:regular r:id="rId40"/>
+      <p:bold r:id="rId41"/>
+      <p:italic r:id="rId42"/>
+      <p:boldItalic r:id="rId43"/>
     </p:embeddedFont>
     <p:embeddedFont>
       <p:font typeface="Titillium Web" panose="020B0604020202020204" charset="0"/>
-      <p:regular r:id="rId43"/>
-      <p:bold r:id="rId44"/>
-      <p:italic r:id="rId45"/>
-      <p:boldItalic r:id="rId46"/>
+      <p:regular r:id="rId44"/>
+      <p:bold r:id="rId45"/>
+      <p:italic r:id="rId46"/>
+      <p:boldItalic r:id="rId47"/>
     </p:embeddedFont>
   </p:embeddedFontLst>
   <p:defaultTextStyle>
@@ -292,6 +293,11 @@
       </a:defRPr>
     </a:lvl9pPr>
   </p:defaultTextStyle>
+  <p:extLst>
+    <p:ext uri="{EFAFB233-063F-42B5-8137-9DF3F51BA10A}">
+      <p15:sldGuideLst xmlns:p15="http://schemas.microsoft.com/office/powerpoint/2012/main"/>
+    </p:ext>
+  </p:extLst>
 </p:presentation>
 </file>
 
@@ -7424,6 +7430,66 @@
       </p:grpSpPr>
       <p:pic>
         <p:nvPicPr>
+          <p:cNvPr id="2" name="Picture 1">
+            <a:extLst>
+              <a:ext uri="{FF2B5EF4-FFF2-40B4-BE49-F238E27FC236}">
+                <a16:creationId xmlns:a16="http://schemas.microsoft.com/office/drawing/2014/main" id="{B8B46310-6CAB-47DA-9AFC-1E00B3630668}"/>
+              </a:ext>
+            </a:extLst>
+          </p:cNvPr>
+          <p:cNvPicPr>
+            <a:picLocks noChangeAspect="1"/>
+          </p:cNvPicPr>
+          <p:nvPr/>
+        </p:nvPicPr>
+        <p:blipFill>
+          <a:blip r:embed="rId2"/>
+          <a:stretch>
+            <a:fillRect/>
+          </a:stretch>
+        </p:blipFill>
+        <p:spPr>
+          <a:xfrm>
+            <a:off x="1182094" y="412020"/>
+            <a:ext cx="6779811" cy="4319459"/>
+          </a:xfrm>
+          <a:prstGeom prst="rect">
+            <a:avLst/>
+          </a:prstGeom>
+        </p:spPr>
+      </p:pic>
+    </p:spTree>
+    <p:extLst>
+      <p:ext uri="{BB962C8B-B14F-4D97-AF65-F5344CB8AC3E}">
+        <p14:creationId xmlns:p14="http://schemas.microsoft.com/office/powerpoint/2010/main" val="2187271914"/>
+      </p:ext>
+    </p:extLst>
+  </p:cSld>
+  <p:clrMapOvr>
+    <a:masterClrMapping/>
+  </p:clrMapOvr>
+</p:sld>
+</file>
+
+<file path=ppt/slides/slide29.xml><?xml version="1.0" encoding="utf-8"?>
+<p:sld xmlns:a="http://schemas.openxmlformats.org/drawingml/2006/main" xmlns:r="http://schemas.openxmlformats.org/officeDocument/2006/relationships" xmlns:p="http://schemas.openxmlformats.org/presentationml/2006/main">
+  <p:cSld>
+    <p:spTree>
+      <p:nvGrpSpPr>
+        <p:cNvPr id="1" name=""/>
+        <p:cNvGrpSpPr/>
+        <p:nvPr/>
+      </p:nvGrpSpPr>
+      <p:grpSpPr>
+        <a:xfrm>
+          <a:off x="0" y="0"/>
+          <a:ext cx="0" cy="0"/>
+          <a:chOff x="0" y="0"/>
+          <a:chExt cx="0" cy="0"/>
+        </a:xfrm>
+      </p:grpSpPr>
+      <p:pic>
+        <p:nvPicPr>
           <p:cNvPr id="5" name="Picture 4">
             <a:extLst>
               <a:ext uri="{FF2B5EF4-FFF2-40B4-BE49-F238E27FC236}">
@@ -7516,7 +7582,140 @@
 </p:sld>
 </file>
 
-<file path=ppt/slides/slide29.xml><?xml version="1.0" encoding="utf-8"?>
+<file path=ppt/slides/slide3.xml><?xml version="1.0" encoding="utf-8"?>
+<p:sld xmlns:a="http://schemas.openxmlformats.org/drawingml/2006/main" xmlns:r="http://schemas.openxmlformats.org/officeDocument/2006/relationships" xmlns:p="http://schemas.openxmlformats.org/presentationml/2006/main">
+  <p:cSld>
+    <p:spTree>
+      <p:nvGrpSpPr>
+        <p:cNvPr id="1" name="Shape 97"/>
+        <p:cNvGrpSpPr/>
+        <p:nvPr/>
+      </p:nvGrpSpPr>
+      <p:grpSpPr>
+        <a:xfrm>
+          <a:off x="0" y="0"/>
+          <a:ext cx="0" cy="0"/>
+          <a:chOff x="0" y="0"/>
+          <a:chExt cx="0" cy="0"/>
+        </a:xfrm>
+      </p:grpSpPr>
+      <p:sp>
+        <p:nvSpPr>
+          <p:cNvPr id="98" name="Google Shape;98;p18"/>
+          <p:cNvSpPr txBox="1">
+            <a:spLocks noGrp="1"/>
+          </p:cNvSpPr>
+          <p:nvPr>
+            <p:ph type="ctrTitle"/>
+          </p:nvPr>
+        </p:nvSpPr>
+        <p:spPr>
+          <a:xfrm>
+            <a:off x="902550" y="1214425"/>
+            <a:ext cx="4461930" cy="1159800"/>
+          </a:xfrm>
+          <a:prstGeom prst="rect">
+            <a:avLst/>
+          </a:prstGeom>
+        </p:spPr>
+        <p:txBody>
+          <a:bodyPr spcFirstLastPara="1" wrap="square" lIns="91425" tIns="91425" rIns="91425" bIns="91425" anchor="t" anchorCtr="0">
+            <a:noAutofit/>
+          </a:bodyPr>
+          <a:lstStyle/>
+          <a:p>
+            <a:pPr marL="0" lvl="0" indent="0" algn="l" rtl="0">
+              <a:spcBef>
+                <a:spcPts val="0"/>
+              </a:spcBef>
+              <a:spcAft>
+                <a:spcPts val="0"/>
+              </a:spcAft>
+              <a:buNone/>
+            </a:pPr>
+            <a:r>
+              <a:rPr lang="en" dirty="0"/>
+              <a:t>A.</a:t>
+            </a:r>
+            <a:endParaRPr dirty="0"/>
+          </a:p>
+          <a:p>
+            <a:pPr marL="0" lvl="0" indent="0" algn="l" rtl="0">
+              <a:spcBef>
+                <a:spcPts val="0"/>
+              </a:spcBef>
+              <a:spcAft>
+                <a:spcPts val="0"/>
+              </a:spcAft>
+              <a:buNone/>
+            </a:pPr>
+            <a:r>
+              <a:rPr lang="en-CA" dirty="0"/>
+              <a:t>Why use R to create your Resume/CV?</a:t>
+            </a:r>
+            <a:endParaRPr dirty="0"/>
+          </a:p>
+        </p:txBody>
+      </p:sp>
+      <p:sp>
+        <p:nvSpPr>
+          <p:cNvPr id="99" name="Google Shape;99;p18"/>
+          <p:cNvSpPr txBox="1">
+            <a:spLocks noGrp="1"/>
+          </p:cNvSpPr>
+          <p:nvPr>
+            <p:ph type="subTitle" idx="1"/>
+          </p:nvPr>
+        </p:nvSpPr>
+        <p:spPr>
+          <a:xfrm>
+            <a:off x="902550" y="2459050"/>
+            <a:ext cx="7632000" cy="784800"/>
+          </a:xfrm>
+          <a:prstGeom prst="rect">
+            <a:avLst/>
+          </a:prstGeom>
+        </p:spPr>
+        <p:txBody>
+          <a:bodyPr spcFirstLastPara="1" wrap="square" lIns="91425" tIns="91425" rIns="91425" bIns="91425" anchor="t" anchorCtr="0">
+            <a:noAutofit/>
+          </a:bodyPr>
+          <a:lstStyle/>
+          <a:p>
+            <a:pPr marL="0" lvl="0" indent="0" algn="l" rtl="0">
+              <a:spcBef>
+                <a:spcPts val="0"/>
+              </a:spcBef>
+              <a:spcAft>
+                <a:spcPts val="0"/>
+              </a:spcAft>
+              <a:buNone/>
+            </a:pPr>
+            <a:endParaRPr lang="en" dirty="0"/>
+          </a:p>
+          <a:p>
+            <a:pPr marL="0" lvl="0" indent="0" algn="l" rtl="0">
+              <a:spcBef>
+                <a:spcPts val="0"/>
+              </a:spcBef>
+              <a:spcAft>
+                <a:spcPts val="0"/>
+              </a:spcAft>
+              <a:buNone/>
+            </a:pPr>
+            <a:endParaRPr lang="en" dirty="0"/>
+          </a:p>
+        </p:txBody>
+      </p:sp>
+    </p:spTree>
+  </p:cSld>
+  <p:clrMapOvr>
+    <a:masterClrMapping/>
+  </p:clrMapOvr>
+</p:sld>
+</file>
+
+<file path=ppt/slides/slide30.xml><?xml version="1.0" encoding="utf-8"?>
 <p:sld xmlns:a="http://schemas.openxmlformats.org/drawingml/2006/main" xmlns:r="http://schemas.openxmlformats.org/officeDocument/2006/relationships" xmlns:p="http://schemas.openxmlformats.org/presentationml/2006/main">
   <p:cSld>
     <p:spTree>
@@ -7627,140 +7826,7 @@
 </p:sld>
 </file>
 
-<file path=ppt/slides/slide3.xml><?xml version="1.0" encoding="utf-8"?>
-<p:sld xmlns:a="http://schemas.openxmlformats.org/drawingml/2006/main" xmlns:r="http://schemas.openxmlformats.org/officeDocument/2006/relationships" xmlns:p="http://schemas.openxmlformats.org/presentationml/2006/main">
-  <p:cSld>
-    <p:spTree>
-      <p:nvGrpSpPr>
-        <p:cNvPr id="1" name="Shape 97"/>
-        <p:cNvGrpSpPr/>
-        <p:nvPr/>
-      </p:nvGrpSpPr>
-      <p:grpSpPr>
-        <a:xfrm>
-          <a:off x="0" y="0"/>
-          <a:ext cx="0" cy="0"/>
-          <a:chOff x="0" y="0"/>
-          <a:chExt cx="0" cy="0"/>
-        </a:xfrm>
-      </p:grpSpPr>
-      <p:sp>
-        <p:nvSpPr>
-          <p:cNvPr id="98" name="Google Shape;98;p18"/>
-          <p:cNvSpPr txBox="1">
-            <a:spLocks noGrp="1"/>
-          </p:cNvSpPr>
-          <p:nvPr>
-            <p:ph type="ctrTitle"/>
-          </p:nvPr>
-        </p:nvSpPr>
-        <p:spPr>
-          <a:xfrm>
-            <a:off x="902550" y="1214425"/>
-            <a:ext cx="4461930" cy="1159800"/>
-          </a:xfrm>
-          <a:prstGeom prst="rect">
-            <a:avLst/>
-          </a:prstGeom>
-        </p:spPr>
-        <p:txBody>
-          <a:bodyPr spcFirstLastPara="1" wrap="square" lIns="91425" tIns="91425" rIns="91425" bIns="91425" anchor="t" anchorCtr="0">
-            <a:noAutofit/>
-          </a:bodyPr>
-          <a:lstStyle/>
-          <a:p>
-            <a:pPr marL="0" lvl="0" indent="0" algn="l" rtl="0">
-              <a:spcBef>
-                <a:spcPts val="0"/>
-              </a:spcBef>
-              <a:spcAft>
-                <a:spcPts val="0"/>
-              </a:spcAft>
-              <a:buNone/>
-            </a:pPr>
-            <a:r>
-              <a:rPr lang="en" dirty="0"/>
-              <a:t>A.</a:t>
-            </a:r>
-            <a:endParaRPr dirty="0"/>
-          </a:p>
-          <a:p>
-            <a:pPr marL="0" lvl="0" indent="0" algn="l" rtl="0">
-              <a:spcBef>
-                <a:spcPts val="0"/>
-              </a:spcBef>
-              <a:spcAft>
-                <a:spcPts val="0"/>
-              </a:spcAft>
-              <a:buNone/>
-            </a:pPr>
-            <a:r>
-              <a:rPr lang="en-CA" dirty="0"/>
-              <a:t>Why use R to create your Resume/CV?</a:t>
-            </a:r>
-            <a:endParaRPr dirty="0"/>
-          </a:p>
-        </p:txBody>
-      </p:sp>
-      <p:sp>
-        <p:nvSpPr>
-          <p:cNvPr id="99" name="Google Shape;99;p18"/>
-          <p:cNvSpPr txBox="1">
-            <a:spLocks noGrp="1"/>
-          </p:cNvSpPr>
-          <p:nvPr>
-            <p:ph type="subTitle" idx="1"/>
-          </p:nvPr>
-        </p:nvSpPr>
-        <p:spPr>
-          <a:xfrm>
-            <a:off x="902550" y="2459050"/>
-            <a:ext cx="7632000" cy="784800"/>
-          </a:xfrm>
-          <a:prstGeom prst="rect">
-            <a:avLst/>
-          </a:prstGeom>
-        </p:spPr>
-        <p:txBody>
-          <a:bodyPr spcFirstLastPara="1" wrap="square" lIns="91425" tIns="91425" rIns="91425" bIns="91425" anchor="t" anchorCtr="0">
-            <a:noAutofit/>
-          </a:bodyPr>
-          <a:lstStyle/>
-          <a:p>
-            <a:pPr marL="0" lvl="0" indent="0" algn="l" rtl="0">
-              <a:spcBef>
-                <a:spcPts val="0"/>
-              </a:spcBef>
-              <a:spcAft>
-                <a:spcPts val="0"/>
-              </a:spcAft>
-              <a:buNone/>
-            </a:pPr>
-            <a:endParaRPr lang="en" dirty="0"/>
-          </a:p>
-          <a:p>
-            <a:pPr marL="0" lvl="0" indent="0" algn="l" rtl="0">
-              <a:spcBef>
-                <a:spcPts val="0"/>
-              </a:spcBef>
-              <a:spcAft>
-                <a:spcPts val="0"/>
-              </a:spcAft>
-              <a:buNone/>
-            </a:pPr>
-            <a:endParaRPr lang="en" dirty="0"/>
-          </a:p>
-        </p:txBody>
-      </p:sp>
-    </p:spTree>
-  </p:cSld>
-  <p:clrMapOvr>
-    <a:masterClrMapping/>
-  </p:clrMapOvr>
-</p:sld>
-</file>
-
-<file path=ppt/slides/slide30.xml><?xml version="1.0" encoding="utf-8"?>
+<file path=ppt/slides/slide31.xml><?xml version="1.0" encoding="utf-8"?>
 <p:sld xmlns:a="http://schemas.openxmlformats.org/drawingml/2006/main" xmlns:r="http://schemas.openxmlformats.org/officeDocument/2006/relationships" xmlns:p="http://schemas.openxmlformats.org/presentationml/2006/main">
   <p:cSld>
     <p:spTree>
@@ -7891,7 +7957,7 @@
 </p:sld>
 </file>
 
-<file path=ppt/slides/slide31.xml><?xml version="1.0" encoding="utf-8"?>
+<file path=ppt/slides/slide32.xml><?xml version="1.0" encoding="utf-8"?>
 <p:sld xmlns:a="http://schemas.openxmlformats.org/drawingml/2006/main" xmlns:r="http://schemas.openxmlformats.org/officeDocument/2006/relationships" xmlns:p="http://schemas.openxmlformats.org/presentationml/2006/main">
   <p:cSld>
     <p:spTree>
@@ -8042,7 +8108,7 @@
 </p:sld>
 </file>
 
-<file path=ppt/slides/slide32.xml><?xml version="1.0" encoding="utf-8"?>
+<file path=ppt/slides/slide33.xml><?xml version="1.0" encoding="utf-8"?>
 <p:sld xmlns:a="http://schemas.openxmlformats.org/drawingml/2006/main" xmlns:r="http://schemas.openxmlformats.org/officeDocument/2006/relationships" xmlns:p="http://schemas.openxmlformats.org/presentationml/2006/main">
   <p:cSld>
     <p:spTree>
@@ -8200,7 +8266,7 @@
 </p:sld>
 </file>
 
-<file path=ppt/slides/slide33.xml><?xml version="1.0" encoding="utf-8"?>
+<file path=ppt/slides/slide34.xml><?xml version="1.0" encoding="utf-8"?>
 <p:sld xmlns:a="http://schemas.openxmlformats.org/drawingml/2006/main" xmlns:r="http://schemas.openxmlformats.org/officeDocument/2006/relationships" xmlns:p="http://schemas.openxmlformats.org/presentationml/2006/main">
   <p:cSld>
     <p:spTree>
@@ -9370,7 +9436,7 @@
 </p:sld>
 </file>
 
-<file path=ppt/slides/slide34.xml><?xml version="1.0" encoding="utf-8"?>
+<file path=ppt/slides/slide35.xml><?xml version="1.0" encoding="utf-8"?>
 <p:sld xmlns:a="http://schemas.openxmlformats.org/drawingml/2006/main" xmlns:r="http://schemas.openxmlformats.org/officeDocument/2006/relationships" xmlns:p="http://schemas.openxmlformats.org/presentationml/2006/main">
   <p:cSld>
     <p:spTree>
@@ -9428,7 +9494,7 @@
 </p:sld>
 </file>
 
-<file path=ppt/slides/slide35.xml><?xml version="1.0" encoding="utf-8"?>
+<file path=ppt/slides/slide36.xml><?xml version="1.0" encoding="utf-8"?>
 <p:sld xmlns:a="http://schemas.openxmlformats.org/drawingml/2006/main" xmlns:r="http://schemas.openxmlformats.org/officeDocument/2006/relationships" xmlns:p="http://schemas.openxmlformats.org/presentationml/2006/main">
   <p:cSld>
     <p:spTree>
@@ -9491,7 +9557,7 @@
 </p:sld>
 </file>
 
-<file path=ppt/slides/slide36.xml><?xml version="1.0" encoding="utf-8"?>
+<file path=ppt/slides/slide37.xml><?xml version="1.0" encoding="utf-8"?>
 <p:sld xmlns:a="http://schemas.openxmlformats.org/drawingml/2006/main" xmlns:r="http://schemas.openxmlformats.org/officeDocument/2006/relationships" xmlns:p="http://schemas.openxmlformats.org/presentationml/2006/main">
   <p:cSld>
     <p:spTree>

</xml_diff>